<commit_message>
Add comments and remove useless messagebox
</commit_message>
<xml_diff>
--- a/W6 Project/KanenOnlineShopping(1).pptx
+++ b/W6 Project/KanenOnlineShopping(1).pptx
@@ -290,7 +290,7 @@
             <a:fld id="{96DFF08F-DC6B-4601-B491-B0F83F6DD2DA}" type="datetimeFigureOut">
               <a:rPr lang="en-US" dirty="0"/>
               <a:pPr/>
-              <a:t>7/18/2016</a:t>
+              <a:t>7/25/2016</a:t>
             </a:fld>
             <a:endParaRPr lang="en-US" dirty="0"/>
           </a:p>
@@ -457,7 +457,7 @@
             <a:fld id="{96DFF08F-DC6B-4601-B491-B0F83F6DD2DA}" type="datetimeFigureOut">
               <a:rPr lang="en-US" dirty="0"/>
               <a:pPr/>
-              <a:t>7/18/2016</a:t>
+              <a:t>7/25/2016</a:t>
             </a:fld>
             <a:endParaRPr lang="en-US" dirty="0"/>
           </a:p>
@@ -677,7 +677,7 @@
             <a:fld id="{96DFF08F-DC6B-4601-B491-B0F83F6DD2DA}" type="datetimeFigureOut">
               <a:rPr lang="en-US" dirty="0"/>
               <a:pPr/>
-              <a:t>7/18/2016</a:t>
+              <a:t>7/25/2016</a:t>
             </a:fld>
             <a:endParaRPr lang="en-US" dirty="0"/>
           </a:p>
@@ -854,7 +854,7 @@
             <a:fld id="{96DFF08F-DC6B-4601-B491-B0F83F6DD2DA}" type="datetimeFigureOut">
               <a:rPr lang="en-US" dirty="0"/>
               <a:pPr/>
-              <a:t>7/18/2016</a:t>
+              <a:t>7/25/2016</a:t>
             </a:fld>
             <a:endParaRPr lang="en-US" dirty="0"/>
           </a:p>
@@ -1157,7 +1157,7 @@
             <a:fld id="{96DFF08F-DC6B-4601-B491-B0F83F6DD2DA}" type="datetimeFigureOut">
               <a:rPr lang="en-US" dirty="0"/>
               <a:pPr/>
-              <a:t>7/18/2016</a:t>
+              <a:t>7/25/2016</a:t>
             </a:fld>
             <a:endParaRPr lang="en-US" dirty="0"/>
           </a:p>
@@ -1458,7 +1458,7 @@
             <a:fld id="{96DFF08F-DC6B-4601-B491-B0F83F6DD2DA}" type="datetimeFigureOut">
               <a:rPr lang="en-US" dirty="0"/>
               <a:pPr/>
-              <a:t>7/18/2016</a:t>
+              <a:t>7/25/2016</a:t>
             </a:fld>
             <a:endParaRPr lang="en-US" dirty="0"/>
           </a:p>
@@ -1877,7 +1877,7 @@
             <a:fld id="{96DFF08F-DC6B-4601-B491-B0F83F6DD2DA}" type="datetimeFigureOut">
               <a:rPr lang="en-US" dirty="0"/>
               <a:pPr/>
-              <a:t>7/18/2016</a:t>
+              <a:t>7/25/2016</a:t>
             </a:fld>
             <a:endParaRPr lang="en-US" dirty="0"/>
           </a:p>
@@ -1992,7 +1992,7 @@
             <a:fld id="{96DFF08F-DC6B-4601-B491-B0F83F6DD2DA}" type="datetimeFigureOut">
               <a:rPr lang="en-US" dirty="0"/>
               <a:pPr/>
-              <a:t>7/18/2016</a:t>
+              <a:t>7/25/2016</a:t>
             </a:fld>
             <a:endParaRPr lang="en-US" dirty="0"/>
           </a:p>
@@ -2084,7 +2084,7 @@
             <a:fld id="{96DFF08F-DC6B-4601-B491-B0F83F6DD2DA}" type="datetimeFigureOut">
               <a:rPr lang="en-US" dirty="0"/>
               <a:pPr/>
-              <a:t>7/18/2016</a:t>
+              <a:t>7/25/2016</a:t>
             </a:fld>
             <a:endParaRPr lang="en-US" dirty="0"/>
           </a:p>
@@ -2354,7 +2354,7 @@
             <a:fld id="{96DFF08F-DC6B-4601-B491-B0F83F6DD2DA}" type="datetimeFigureOut">
               <a:rPr lang="en-US" dirty="0"/>
               <a:pPr/>
-              <a:t>7/18/2016</a:t>
+              <a:t>7/25/2016</a:t>
             </a:fld>
             <a:endParaRPr lang="en-US" dirty="0"/>
           </a:p>
@@ -2616,7 +2616,7 @@
             <a:fld id="{96DFF08F-DC6B-4601-B491-B0F83F6DD2DA}" type="datetimeFigureOut">
               <a:rPr lang="en-US" dirty="0"/>
               <a:pPr/>
-              <a:t>7/18/2016</a:t>
+              <a:t>7/25/2016</a:t>
             </a:fld>
             <a:endParaRPr lang="en-US" dirty="0"/>
           </a:p>
@@ -2862,7 +2862,7 @@
             <a:fld id="{96DFF08F-DC6B-4601-B491-B0F83F6DD2DA}" type="datetimeFigureOut">
               <a:rPr lang="en-US" dirty="0"/>
               <a:pPr/>
-              <a:t>7/18/2016</a:t>
+              <a:t>7/25/2016</a:t>
             </a:fld>
             <a:endParaRPr lang="en-US" dirty="0"/>
           </a:p>
@@ -3422,7 +3422,7 @@
     </p:spTree>
     <p:extLst>
       <p:ext uri="{BB962C8B-B14F-4D97-AF65-F5344CB8AC3E}">
-        <p14:creationId xmlns="" xmlns:p14="http://schemas.microsoft.com/office/powerpoint/2010/main" val="270940843"/>
+        <p14:creationId xmlns:p14="http://schemas.microsoft.com/office/powerpoint/2010/main" xmlns="" val="270940843"/>
       </p:ext>
     </p:extLst>
   </p:cSld>
@@ -3540,7 +3540,7 @@
     </p:spTree>
     <p:extLst>
       <p:ext uri="{BB962C8B-B14F-4D97-AF65-F5344CB8AC3E}">
-        <p14:creationId xmlns="" xmlns:p14="http://schemas.microsoft.com/office/powerpoint/2010/main" val="1702245215"/>
+        <p14:creationId xmlns:p14="http://schemas.microsoft.com/office/powerpoint/2010/main" xmlns="" val="1702245215"/>
       </p:ext>
     </p:extLst>
   </p:cSld>
@@ -3610,7 +3610,7 @@
         <p:spPr/>
         <p:txBody>
           <a:bodyPr>
-            <a:normAutofit lnSpcReduction="10000"/>
+            <a:normAutofit fontScale="92500" lnSpcReduction="10000"/>
           </a:bodyPr>
           <a:lstStyle/>
           <a:p>
@@ -3619,8 +3619,13 @@
             </a:pPr>
             <a:r>
               <a:rPr lang="en-US" sz="2800" u="sng" dirty="0" smtClean="0"/>
-              <a:t>UI Design and Back-End</a:t>
-            </a:r>
+              <a:t>UI Design and </a:t>
+            </a:r>
+            <a:r>
+              <a:rPr lang="en-US" sz="2800" u="sng" dirty="0" smtClean="0"/>
+              <a:t>Back-End </a:t>
+            </a:r>
+            <a:endParaRPr lang="en-US" sz="2800" u="sng" dirty="0" smtClean="0"/>
           </a:p>
           <a:p>
             <a:pPr>
@@ -3628,15 +3633,15 @@
             </a:pPr>
             <a:r>
               <a:rPr lang="en-PH" sz="2800" dirty="0" smtClean="0"/>
-              <a:t>Melvin- Order Transaction, Layout, </a:t>
-            </a:r>
-            <a:r>
-              <a:rPr lang="en-PH" sz="2800" dirty="0" err="1" smtClean="0"/>
-              <a:t>debbugging</a:t>
+              <a:t>Melvin – Entire Admin back end, JMS Consumer, </a:t>
             </a:r>
             <a:r>
               <a:rPr lang="en-PH" sz="2800" dirty="0" smtClean="0"/>
-              <a:t>, controllers</a:t>
+              <a:t>L</a:t>
+            </a:r>
+            <a:r>
+              <a:rPr lang="en-PH" sz="2800" dirty="0" smtClean="0"/>
+              <a:t>istener</a:t>
             </a:r>
             <a:endParaRPr lang="en-PH" sz="2800" dirty="0" smtClean="0"/>
           </a:p>
@@ -3650,12 +3655,25 @@
             </a:r>
             <a:r>
               <a:rPr lang="en-PH" sz="2800" dirty="0" smtClean="0"/>
-              <a:t>Baste- </a:t>
+              <a:t>Baste – Membership, Product, User, Debugging, Discount, Class Diagram, ERD, Database Update, JMS Producer, </a:t>
+            </a:r>
+            <a:r>
+              <a:rPr lang="en-PH" sz="2800" dirty="0" err="1" smtClean="0"/>
+              <a:t>JUnit</a:t>
             </a:r>
             <a:r>
               <a:rPr lang="en-PH" sz="2800" dirty="0" smtClean="0"/>
-              <a:t>Product Display, Layout</a:t>
-            </a:r>
+              <a:t>, </a:t>
+            </a:r>
+            <a:r>
+              <a:rPr lang="en-PH" sz="2800" dirty="0" err="1" smtClean="0"/>
+              <a:t>BaseDAO</a:t>
+            </a:r>
+            <a:r>
+              <a:rPr lang="en-PH" sz="2800" dirty="0" smtClean="0"/>
+              <a:t>.</a:t>
+            </a:r>
+            <a:endParaRPr lang="en-PH" sz="2800" dirty="0" smtClean="0"/>
           </a:p>
           <a:p>
             <a:pPr>
@@ -3667,11 +3685,19 @@
             </a:r>
             <a:r>
               <a:rPr lang="en-PH" sz="2800" dirty="0" smtClean="0"/>
-              <a:t>-  Order Details, Order Summary, Filter, </a:t>
+              <a:t> </a:t>
             </a:r>
             <a:r>
               <a:rPr lang="en-PH" sz="2800" dirty="0" smtClean="0"/>
-              <a:t>Remove items from cart</a:t>
+              <a:t>– Entire </a:t>
+            </a:r>
+            <a:r>
+              <a:rPr lang="en-PH" sz="2800" dirty="0" smtClean="0"/>
+              <a:t> Admin </a:t>
+            </a:r>
+            <a:r>
+              <a:rPr lang="en-PH" sz="2800" dirty="0" smtClean="0"/>
+              <a:t>front end.</a:t>
             </a:r>
             <a:endParaRPr lang="en-US" sz="2800" dirty="0" smtClean="0"/>
           </a:p>
@@ -3681,8 +3707,9 @@
             </a:pPr>
             <a:r>
               <a:rPr lang="en-US" sz="2800" dirty="0" smtClean="0"/>
-              <a:t>Alexis-User Controller, Product Controller, Order Controller</a:t>
-            </a:r>
+              <a:t>Alexis – User profile, Membership request.</a:t>
+            </a:r>
+            <a:endParaRPr lang="en-US" sz="2800" dirty="0" smtClean="0"/>
           </a:p>
           <a:p>
             <a:pPr>
@@ -3690,8 +3717,9 @@
             </a:pPr>
             <a:r>
               <a:rPr lang="en-US" sz="2800" dirty="0" smtClean="0"/>
-              <a:t>Aica- DAO, Services, Listener</a:t>
-            </a:r>
+              <a:t>Aica – Save cart, Sequence Diagram, Cart Controller.</a:t>
+            </a:r>
+            <a:endParaRPr lang="en-US" sz="2800" dirty="0" smtClean="0"/>
           </a:p>
           <a:p>
             <a:pPr>
@@ -3699,7 +3727,11 @@
             </a:pPr>
             <a:r>
               <a:rPr lang="en-US" sz="2800" dirty="0" smtClean="0"/>
-              <a:t>JB- Log4j, Registration, Login, Ajax Requests, Order Details</a:t>
+              <a:t>JB – Entities, User Controller , Order Controller, Cart Controller , JPA , DAO </a:t>
+            </a:r>
+            <a:r>
+              <a:rPr lang="en-US" sz="2800" dirty="0" err="1" smtClean="0"/>
+              <a:t>Impls</a:t>
             </a:r>
             <a:endParaRPr lang="en-US" sz="1800" dirty="0" smtClean="0"/>
           </a:p>
@@ -3711,7 +3743,7 @@
     </p:spTree>
     <p:extLst>
       <p:ext uri="{BB962C8B-B14F-4D97-AF65-F5344CB8AC3E}">
-        <p14:creationId xmlns="" xmlns:p14="http://schemas.microsoft.com/office/powerpoint/2010/main" val="2887323172"/>
+        <p14:creationId xmlns:p14="http://schemas.microsoft.com/office/powerpoint/2010/main" xmlns="" val="2887323172"/>
       </p:ext>
     </p:extLst>
   </p:cSld>
@@ -3808,7 +3840,7 @@
         <p:spPr/>
         <p:txBody>
           <a:bodyPr>
-            <a:normAutofit fontScale="85000" lnSpcReduction="20000"/>
+            <a:normAutofit fontScale="47500" lnSpcReduction="20000"/>
           </a:bodyPr>
           <a:lstStyle/>
           <a:p>
@@ -3861,6 +3893,30 @@
             <a:r>
               <a:rPr lang="en-PH" sz="2800" dirty="0" smtClean="0"/>
               <a:t>Order Summary</a:t>
+            </a:r>
+          </a:p>
+          <a:p>
+            <a:r>
+              <a:rPr lang="en-PH" sz="2800" dirty="0" smtClean="0"/>
+              <a:t>Save cart on logout</a:t>
+            </a:r>
+          </a:p>
+          <a:p>
+            <a:r>
+              <a:rPr lang="en-PH" sz="2800" dirty="0" smtClean="0"/>
+              <a:t>User Profile maintenance</a:t>
+            </a:r>
+          </a:p>
+          <a:p>
+            <a:r>
+              <a:rPr lang="en-PH" sz="2800" dirty="0" smtClean="0"/>
+              <a:t>JMS Producer and Consumer</a:t>
+            </a:r>
+          </a:p>
+          <a:p>
+            <a:r>
+              <a:rPr lang="en-PH" sz="2800" dirty="0" smtClean="0"/>
+              <a:t>Admin</a:t>
             </a:r>
             <a:endParaRPr lang="en-US" sz="2800" dirty="0" smtClean="0"/>
           </a:p>
@@ -3910,22 +3966,8 @@
           <a:lstStyle/>
           <a:p>
             <a:r>
-              <a:rPr lang="en-US" sz="2000" dirty="0" smtClean="0"/>
-              <a:t>Order confirmation page</a:t>
-            </a:r>
-            <a:r>
-              <a:rPr lang="en-US" sz="2000" dirty="0" smtClean="0"/>
-              <a:t> by admin</a:t>
-            </a:r>
-          </a:p>
-          <a:p>
-            <a:r>
               <a:rPr lang="en-US" sz="2000" dirty="0" err="1" smtClean="0"/>
               <a:t>Validator</a:t>
-            </a:r>
-            <a:r>
-              <a:rPr lang="en-US" sz="2000" dirty="0" smtClean="0"/>
-              <a:t>  in backend</a:t>
             </a:r>
             <a:endParaRPr lang="en-US" sz="2000" dirty="0" smtClean="0"/>
           </a:p>
@@ -3934,7 +3976,7 @@
     </p:spTree>
     <p:extLst>
       <p:ext uri="{BB962C8B-B14F-4D97-AF65-F5344CB8AC3E}">
-        <p14:creationId xmlns="" xmlns:p14="http://schemas.microsoft.com/office/powerpoint/2010/main" val="931742086"/>
+        <p14:creationId xmlns:p14="http://schemas.microsoft.com/office/powerpoint/2010/main" xmlns="" val="931742086"/>
       </p:ext>
     </p:extLst>
   </p:cSld>
@@ -4013,7 +4055,7 @@
     </p:spTree>
     <p:extLst>
       <p:ext uri="{BB962C8B-B14F-4D97-AF65-F5344CB8AC3E}">
-        <p14:creationId xmlns="" xmlns:p14="http://schemas.microsoft.com/office/powerpoint/2010/main" val="3679550233"/>
+        <p14:creationId xmlns:p14="http://schemas.microsoft.com/office/powerpoint/2010/main" xmlns="" val="3679550233"/>
       </p:ext>
     </p:extLst>
   </p:cSld>
@@ -4083,7 +4125,7 @@
         <p:spPr/>
         <p:txBody>
           <a:bodyPr numCol="2">
-            <a:normAutofit fontScale="92500" lnSpcReduction="20000"/>
+            <a:normAutofit fontScale="62500" lnSpcReduction="20000"/>
           </a:bodyPr>
           <a:lstStyle/>
           <a:p>
@@ -4181,9 +4223,33 @@
             </a:r>
           </a:p>
           <a:p>
-            <a:pPr>
-              <a:buNone/>
-            </a:pPr>
+            <a:r>
+              <a:rPr lang="en-US" sz="2800" dirty="0" smtClean="0"/>
+              <a:t>JMS Producer and Consumer</a:t>
+            </a:r>
+          </a:p>
+          <a:p>
+            <a:r>
+              <a:rPr lang="en-US" sz="2800" dirty="0" smtClean="0"/>
+              <a:t>JPA</a:t>
+            </a:r>
+          </a:p>
+          <a:p>
+            <a:r>
+              <a:rPr lang="en-US" sz="2800" dirty="0" err="1" smtClean="0"/>
+              <a:t>JUNit</a:t>
+            </a:r>
+            <a:endParaRPr lang="en-US" sz="2800" dirty="0" smtClean="0"/>
+          </a:p>
+          <a:p>
+            <a:r>
+              <a:rPr lang="en-US" sz="2800" dirty="0" smtClean="0"/>
+              <a:t>Restful </a:t>
+            </a:r>
+            <a:r>
+              <a:rPr lang="en-US" sz="2800" dirty="0" err="1" smtClean="0"/>
+              <a:t>Webservice</a:t>
+            </a:r>
             <a:endParaRPr lang="en-US" sz="2800" dirty="0" smtClean="0"/>
           </a:p>
           <a:p>
@@ -4206,7 +4272,7 @@
     </p:spTree>
     <p:extLst>
       <p:ext uri="{BB962C8B-B14F-4D97-AF65-F5344CB8AC3E}">
-        <p14:creationId xmlns="" xmlns:p14="http://schemas.microsoft.com/office/powerpoint/2010/main" val="3138334490"/>
+        <p14:creationId xmlns:p14="http://schemas.microsoft.com/office/powerpoint/2010/main" xmlns="" val="3138334490"/>
       </p:ext>
     </p:extLst>
   </p:cSld>
@@ -4346,29 +4412,17 @@
           <a:p>
             <a:r>
               <a:rPr lang="en-PH" sz="2800" dirty="0" smtClean="0"/>
-              <a:t>Configuration in Spring </a:t>
-            </a:r>
-            <a:r>
-              <a:rPr lang="en-PH" sz="2800" smtClean="0"/>
-              <a:t>tool </a:t>
-            </a:r>
-            <a:r>
-              <a:rPr lang="en-PH" sz="2800" smtClean="0"/>
-              <a:t>Suite</a:t>
-            </a:r>
+              <a:t>JPA</a:t>
+            </a:r>
+          </a:p>
+          <a:p>
+            <a:r>
+              <a:rPr lang="en-PH" sz="2800" dirty="0" smtClean="0"/>
+              <a:t>Transaction already active exception</a:t>
+            </a:r>
+          </a:p>
+          <a:p>
             <a:endParaRPr lang="en-PH" sz="2800" dirty="0" smtClean="0"/>
-          </a:p>
-          <a:p>
-            <a:r>
-              <a:rPr lang="en-PH" sz="2800" dirty="0" smtClean="0"/>
-              <a:t>Transaction Block.</a:t>
-            </a:r>
-          </a:p>
-          <a:p>
-            <a:r>
-              <a:rPr lang="en-PH" sz="2800" dirty="0" smtClean="0"/>
-              <a:t>Store filtering. </a:t>
-            </a:r>
           </a:p>
           <a:p>
             <a:endParaRPr lang="en-US" sz="2800" dirty="0" smtClean="0"/>
@@ -4381,7 +4435,7 @@
     </p:spTree>
     <p:extLst>
       <p:ext uri="{BB962C8B-B14F-4D97-AF65-F5344CB8AC3E}">
-        <p14:creationId xmlns="" xmlns:p14="http://schemas.microsoft.com/office/powerpoint/2010/main" val="3138334490"/>
+        <p14:creationId xmlns:p14="http://schemas.microsoft.com/office/powerpoint/2010/main" xmlns="" val="3138334490"/>
       </p:ext>
     </p:extLst>
   </p:cSld>
@@ -4654,7 +4708,7 @@
   <a:extraClrSchemeLst/>
   <a:extLst>
     <a:ext uri="{05A4C25C-085E-4340-85A3-A5531E510DB2}">
-      <thm15:themeFamily xmlns="" xmlns:thm15="http://schemas.microsoft.com/office/thememl/2012/main" name="Banded" id="{98DFF888-2449-4D28-977C-6306C017633E}" vid="{9792607F-9579-4224-82FF-9C88C3E1E53D}"/>
+      <thm15:themeFamily xmlns:thm15="http://schemas.microsoft.com/office/thememl/2012/main" xmlns="" name="Banded" id="{98DFF888-2449-4D28-977C-6306C017633E}" vid="{9792607F-9579-4224-82FF-9C88C3E1E53D}"/>
     </a:ext>
   </a:extLst>
 </a:theme>

</xml_diff>